<commit_message>
corrected Typo for image files #449
</commit_message>
<xml_diff>
--- a/source/ArchitectureInDetail/images_SessionManagement/materialSessionManagement.pptx
+++ b/source/ArchitectureInDetail/images_SessionManagement/materialSessionManagement.pptx
@@ -218,7 +218,7 @@
             <a:fld id="{3BB47352-BF5A-4CD2-B029-996118CD8E01}" type="datetimeFigureOut">
               <a:rPr kumimoji="1" lang="ja-JP" altLang="en-US" smtClean="0"/>
               <a:pPr/>
-              <a:t>2014/10/15</a:t>
+              <a:t>2014/10/27</a:t>
             </a:fld>
             <a:endParaRPr kumimoji="1" lang="ja-JP" altLang="en-US"/>
           </a:p>
@@ -701,7 +701,7 @@
             <a:fld id="{7B9B12EC-6AA0-374B-A2D3-850081A07A26}" type="datetimeFigureOut">
               <a:rPr kumimoji="1" lang="ja-JP" altLang="en-US" smtClean="0"/>
               <a:pPr/>
-              <a:t>2014/10/15</a:t>
+              <a:t>2014/10/27</a:t>
             </a:fld>
             <a:endParaRPr kumimoji="1" lang="ja-JP" altLang="en-US"/>
           </a:p>
@@ -905,7 +905,7 @@
             <a:fld id="{7B9B12EC-6AA0-374B-A2D3-850081A07A26}" type="datetimeFigureOut">
               <a:rPr kumimoji="1" lang="ja-JP" altLang="en-US" smtClean="0"/>
               <a:pPr/>
-              <a:t>2014/10/15</a:t>
+              <a:t>2014/10/27</a:t>
             </a:fld>
             <a:endParaRPr kumimoji="1" lang="ja-JP" altLang="en-US"/>
           </a:p>
@@ -1119,7 +1119,7 @@
             <a:fld id="{7B9B12EC-6AA0-374B-A2D3-850081A07A26}" type="datetimeFigureOut">
               <a:rPr kumimoji="1" lang="ja-JP" altLang="en-US" smtClean="0"/>
               <a:pPr/>
-              <a:t>2014/10/15</a:t>
+              <a:t>2014/10/27</a:t>
             </a:fld>
             <a:endParaRPr kumimoji="1" lang="ja-JP" altLang="en-US"/>
           </a:p>
@@ -1323,7 +1323,7 @@
             <a:fld id="{7B9B12EC-6AA0-374B-A2D3-850081A07A26}" type="datetimeFigureOut">
               <a:rPr kumimoji="1" lang="ja-JP" altLang="en-US" smtClean="0"/>
               <a:pPr/>
-              <a:t>2014/10/15</a:t>
+              <a:t>2014/10/27</a:t>
             </a:fld>
             <a:endParaRPr kumimoji="1" lang="ja-JP" altLang="en-US"/>
           </a:p>
@@ -1571,7 +1571,7 @@
             <a:fld id="{7B9B12EC-6AA0-374B-A2D3-850081A07A26}" type="datetimeFigureOut">
               <a:rPr kumimoji="1" lang="ja-JP" altLang="en-US" smtClean="0"/>
               <a:pPr/>
-              <a:t>2014/10/15</a:t>
+              <a:t>2014/10/27</a:t>
             </a:fld>
             <a:endParaRPr kumimoji="1" lang="ja-JP" altLang="en-US"/>
           </a:p>
@@ -1925,7 +1925,7 @@
             <a:fld id="{7B9B12EC-6AA0-374B-A2D3-850081A07A26}" type="datetimeFigureOut">
               <a:rPr kumimoji="1" lang="ja-JP" altLang="en-US" smtClean="0"/>
               <a:pPr/>
-              <a:t>2014/10/15</a:t>
+              <a:t>2014/10/27</a:t>
             </a:fld>
             <a:endParaRPr kumimoji="1" lang="ja-JP" altLang="en-US"/>
           </a:p>
@@ -2413,7 +2413,7 @@
             <a:fld id="{7B9B12EC-6AA0-374B-A2D3-850081A07A26}" type="datetimeFigureOut">
               <a:rPr kumimoji="1" lang="ja-JP" altLang="en-US" smtClean="0"/>
               <a:pPr/>
-              <a:t>2014/10/15</a:t>
+              <a:t>2014/10/27</a:t>
             </a:fld>
             <a:endParaRPr kumimoji="1" lang="ja-JP" altLang="en-US"/>
           </a:p>
@@ -2533,7 +2533,7 @@
             <a:fld id="{7B9B12EC-6AA0-374B-A2D3-850081A07A26}" type="datetimeFigureOut">
               <a:rPr kumimoji="1" lang="ja-JP" altLang="en-US" smtClean="0"/>
               <a:pPr/>
-              <a:t>2014/10/15</a:t>
+              <a:t>2014/10/27</a:t>
             </a:fld>
             <a:endParaRPr kumimoji="1" lang="ja-JP" altLang="en-US"/>
           </a:p>
@@ -2630,7 +2630,7 @@
             <a:fld id="{7B9B12EC-6AA0-374B-A2D3-850081A07A26}" type="datetimeFigureOut">
               <a:rPr kumimoji="1" lang="ja-JP" altLang="en-US" smtClean="0"/>
               <a:pPr/>
-              <a:t>2014/10/15</a:t>
+              <a:t>2014/10/27</a:t>
             </a:fld>
             <a:endParaRPr kumimoji="1" lang="ja-JP" altLang="en-US"/>
           </a:p>
@@ -2941,7 +2941,7 @@
             <a:fld id="{7B9B12EC-6AA0-374B-A2D3-850081A07A26}" type="datetimeFigureOut">
               <a:rPr kumimoji="1" lang="ja-JP" altLang="en-US" smtClean="0"/>
               <a:pPr/>
-              <a:t>2014/10/15</a:t>
+              <a:t>2014/10/27</a:t>
             </a:fld>
             <a:endParaRPr kumimoji="1" lang="ja-JP" altLang="en-US"/>
           </a:p>
@@ -3196,7 +3196,7 @@
             <a:fld id="{7B9B12EC-6AA0-374B-A2D3-850081A07A26}" type="datetimeFigureOut">
               <a:rPr kumimoji="1" lang="ja-JP" altLang="en-US" smtClean="0"/>
               <a:pPr/>
-              <a:t>2014/10/15</a:t>
+              <a:t>2014/10/27</a:t>
             </a:fld>
             <a:endParaRPr kumimoji="1" lang="ja-JP" altLang="en-US"/>
           </a:p>
@@ -3443,7 +3443,7 @@
             <a:fld id="{7B9B12EC-6AA0-374B-A2D3-850081A07A26}" type="datetimeFigureOut">
               <a:rPr kumimoji="1" lang="ja-JP" altLang="en-US" smtClean="0"/>
               <a:pPr/>
-              <a:t>2014/10/15</a:t>
+              <a:t>2014/10/27</a:t>
             </a:fld>
             <a:endParaRPr kumimoji="1" lang="ja-JP" altLang="en-US"/>
           </a:p>
@@ -12588,7 +12588,7 @@
       </p:grpSpPr>
       <p:pic>
         <p:nvPicPr>
-          <p:cNvPr id="1026" name="Picture 2"/>
+          <p:cNvPr id="1029" name="Picture 5"/>
           <p:cNvPicPr>
             <a:picLocks noChangeAspect="1" noChangeArrowheads="1"/>
           </p:cNvPicPr>
@@ -12609,8 +12609,8 @@
         </p:blipFill>
         <p:spPr bwMode="auto">
           <a:xfrm>
-            <a:off x="395536" y="404664"/>
-            <a:ext cx="2376264" cy="1479308"/>
+            <a:off x="5940152" y="2320884"/>
+            <a:ext cx="2324100" cy="1466850"/>
           </a:xfrm>
           <a:prstGeom prst="rect">
             <a:avLst/>
@@ -12642,7 +12642,7 @@
       </p:pic>
       <p:pic>
         <p:nvPicPr>
-          <p:cNvPr id="1028" name="Picture 4"/>
+          <p:cNvPr id="3" name="Picture 4"/>
           <p:cNvPicPr>
             <a:picLocks noChangeAspect="1" noChangeArrowheads="1"/>
           </p:cNvPicPr>
@@ -12663,8 +12663,8 @@
         </p:blipFill>
         <p:spPr bwMode="auto">
           <a:xfrm>
-            <a:off x="3203848" y="404664"/>
-            <a:ext cx="2358147" cy="1490402"/>
+            <a:off x="3214665" y="2311359"/>
+            <a:ext cx="2362200" cy="1476375"/>
           </a:xfrm>
           <a:prstGeom prst="rect">
             <a:avLst/>
@@ -12696,7 +12696,7 @@
       </p:pic>
       <p:pic>
         <p:nvPicPr>
-          <p:cNvPr id="1030" name="Picture 6"/>
+          <p:cNvPr id="1026" name="Picture 2"/>
           <p:cNvPicPr>
             <a:picLocks noChangeAspect="1" noChangeArrowheads="1"/>
           </p:cNvPicPr>
@@ -12717,8 +12717,8 @@
         </p:blipFill>
         <p:spPr bwMode="auto">
           <a:xfrm>
-            <a:off x="5940152" y="412990"/>
-            <a:ext cx="2358147" cy="1482076"/>
+            <a:off x="395536" y="404664"/>
+            <a:ext cx="2376264" cy="1479308"/>
           </a:xfrm>
           <a:prstGeom prst="rect">
             <a:avLst/>
@@ -12750,7 +12750,7 @@
       </p:pic>
       <p:pic>
         <p:nvPicPr>
-          <p:cNvPr id="1031" name="Picture 7"/>
+          <p:cNvPr id="1028" name="Picture 4"/>
           <p:cNvPicPr>
             <a:picLocks noChangeAspect="1" noChangeArrowheads="1"/>
           </p:cNvPicPr>
@@ -12771,8 +12771,8 @@
         </p:blipFill>
         <p:spPr bwMode="auto">
           <a:xfrm>
-            <a:off x="3181004" y="2301596"/>
-            <a:ext cx="2330841" cy="1460049"/>
+            <a:off x="3203848" y="404664"/>
+            <a:ext cx="2358147" cy="1490402"/>
           </a:xfrm>
           <a:prstGeom prst="rect">
             <a:avLst/>
@@ -12804,7 +12804,7 @@
       </p:pic>
       <p:pic>
         <p:nvPicPr>
-          <p:cNvPr id="1032" name="Picture 8"/>
+          <p:cNvPr id="1030" name="Picture 6"/>
           <p:cNvPicPr>
             <a:picLocks noChangeAspect="1" noChangeArrowheads="1"/>
           </p:cNvPicPr>
@@ -12825,8 +12825,8 @@
         </p:blipFill>
         <p:spPr bwMode="auto">
           <a:xfrm>
-            <a:off x="6001950" y="2311359"/>
-            <a:ext cx="2311393" cy="1450286"/>
+            <a:off x="5940152" y="412990"/>
+            <a:ext cx="2358147" cy="1482076"/>
           </a:xfrm>
           <a:prstGeom prst="rect">
             <a:avLst/>

</xml_diff>

<commit_message>
corrected Typo for image files(modify overlook) #449
</commit_message>
<xml_diff>
--- a/source/ArchitectureInDetail/images_SessionManagement/materialSessionManagement.pptx
+++ b/source/ArchitectureInDetail/images_SessionManagement/materialSessionManagement.pptx
@@ -218,7 +218,7 @@
             <a:fld id="{3BB47352-BF5A-4CD2-B029-996118CD8E01}" type="datetimeFigureOut">
               <a:rPr kumimoji="1" lang="ja-JP" altLang="en-US" smtClean="0"/>
               <a:pPr/>
-              <a:t>2014/10/27</a:t>
+              <a:t>2014/10/28</a:t>
             </a:fld>
             <a:endParaRPr kumimoji="1" lang="ja-JP" altLang="en-US"/>
           </a:p>
@@ -701,7 +701,7 @@
             <a:fld id="{7B9B12EC-6AA0-374B-A2D3-850081A07A26}" type="datetimeFigureOut">
               <a:rPr kumimoji="1" lang="ja-JP" altLang="en-US" smtClean="0"/>
               <a:pPr/>
-              <a:t>2014/10/27</a:t>
+              <a:t>2014/10/28</a:t>
             </a:fld>
             <a:endParaRPr kumimoji="1" lang="ja-JP" altLang="en-US"/>
           </a:p>
@@ -905,7 +905,7 @@
             <a:fld id="{7B9B12EC-6AA0-374B-A2D3-850081A07A26}" type="datetimeFigureOut">
               <a:rPr kumimoji="1" lang="ja-JP" altLang="en-US" smtClean="0"/>
               <a:pPr/>
-              <a:t>2014/10/27</a:t>
+              <a:t>2014/10/28</a:t>
             </a:fld>
             <a:endParaRPr kumimoji="1" lang="ja-JP" altLang="en-US"/>
           </a:p>
@@ -1119,7 +1119,7 @@
             <a:fld id="{7B9B12EC-6AA0-374B-A2D3-850081A07A26}" type="datetimeFigureOut">
               <a:rPr kumimoji="1" lang="ja-JP" altLang="en-US" smtClean="0"/>
               <a:pPr/>
-              <a:t>2014/10/27</a:t>
+              <a:t>2014/10/28</a:t>
             </a:fld>
             <a:endParaRPr kumimoji="1" lang="ja-JP" altLang="en-US"/>
           </a:p>
@@ -1323,7 +1323,7 @@
             <a:fld id="{7B9B12EC-6AA0-374B-A2D3-850081A07A26}" type="datetimeFigureOut">
               <a:rPr kumimoji="1" lang="ja-JP" altLang="en-US" smtClean="0"/>
               <a:pPr/>
-              <a:t>2014/10/27</a:t>
+              <a:t>2014/10/28</a:t>
             </a:fld>
             <a:endParaRPr kumimoji="1" lang="ja-JP" altLang="en-US"/>
           </a:p>
@@ -1571,7 +1571,7 @@
             <a:fld id="{7B9B12EC-6AA0-374B-A2D3-850081A07A26}" type="datetimeFigureOut">
               <a:rPr kumimoji="1" lang="ja-JP" altLang="en-US" smtClean="0"/>
               <a:pPr/>
-              <a:t>2014/10/27</a:t>
+              <a:t>2014/10/28</a:t>
             </a:fld>
             <a:endParaRPr kumimoji="1" lang="ja-JP" altLang="en-US"/>
           </a:p>
@@ -1925,7 +1925,7 @@
             <a:fld id="{7B9B12EC-6AA0-374B-A2D3-850081A07A26}" type="datetimeFigureOut">
               <a:rPr kumimoji="1" lang="ja-JP" altLang="en-US" smtClean="0"/>
               <a:pPr/>
-              <a:t>2014/10/27</a:t>
+              <a:t>2014/10/28</a:t>
             </a:fld>
             <a:endParaRPr kumimoji="1" lang="ja-JP" altLang="en-US"/>
           </a:p>
@@ -2413,7 +2413,7 @@
             <a:fld id="{7B9B12EC-6AA0-374B-A2D3-850081A07A26}" type="datetimeFigureOut">
               <a:rPr kumimoji="1" lang="ja-JP" altLang="en-US" smtClean="0"/>
               <a:pPr/>
-              <a:t>2014/10/27</a:t>
+              <a:t>2014/10/28</a:t>
             </a:fld>
             <a:endParaRPr kumimoji="1" lang="ja-JP" altLang="en-US"/>
           </a:p>
@@ -2533,7 +2533,7 @@
             <a:fld id="{7B9B12EC-6AA0-374B-A2D3-850081A07A26}" type="datetimeFigureOut">
               <a:rPr kumimoji="1" lang="ja-JP" altLang="en-US" smtClean="0"/>
               <a:pPr/>
-              <a:t>2014/10/27</a:t>
+              <a:t>2014/10/28</a:t>
             </a:fld>
             <a:endParaRPr kumimoji="1" lang="ja-JP" altLang="en-US"/>
           </a:p>
@@ -2630,7 +2630,7 @@
             <a:fld id="{7B9B12EC-6AA0-374B-A2D3-850081A07A26}" type="datetimeFigureOut">
               <a:rPr kumimoji="1" lang="ja-JP" altLang="en-US" smtClean="0"/>
               <a:pPr/>
-              <a:t>2014/10/27</a:t>
+              <a:t>2014/10/28</a:t>
             </a:fld>
             <a:endParaRPr kumimoji="1" lang="ja-JP" altLang="en-US"/>
           </a:p>
@@ -2941,7 +2941,7 @@
             <a:fld id="{7B9B12EC-6AA0-374B-A2D3-850081A07A26}" type="datetimeFigureOut">
               <a:rPr kumimoji="1" lang="ja-JP" altLang="en-US" smtClean="0"/>
               <a:pPr/>
-              <a:t>2014/10/27</a:t>
+              <a:t>2014/10/28</a:t>
             </a:fld>
             <a:endParaRPr kumimoji="1" lang="ja-JP" altLang="en-US"/>
           </a:p>
@@ -3196,7 +3196,7 @@
             <a:fld id="{7B9B12EC-6AA0-374B-A2D3-850081A07A26}" type="datetimeFigureOut">
               <a:rPr kumimoji="1" lang="ja-JP" altLang="en-US" smtClean="0"/>
               <a:pPr/>
-              <a:t>2014/10/27</a:t>
+              <a:t>2014/10/28</a:t>
             </a:fld>
             <a:endParaRPr kumimoji="1" lang="ja-JP" altLang="en-US"/>
           </a:p>
@@ -3443,7 +3443,7 @@
             <a:fld id="{7B9B12EC-6AA0-374B-A2D3-850081A07A26}" type="datetimeFigureOut">
               <a:rPr kumimoji="1" lang="ja-JP" altLang="en-US" smtClean="0"/>
               <a:pPr/>
-              <a:t>2014/10/27</a:t>
+              <a:t>2014/10/28</a:t>
             </a:fld>
             <a:endParaRPr kumimoji="1" lang="ja-JP" altLang="en-US"/>
           </a:p>
@@ -12588,7 +12588,7 @@
       </p:grpSpPr>
       <p:pic>
         <p:nvPicPr>
-          <p:cNvPr id="1029" name="Picture 5"/>
+          <p:cNvPr id="4" name="Picture 4"/>
           <p:cNvPicPr>
             <a:picLocks noChangeAspect="1" noChangeArrowheads="1"/>
           </p:cNvPicPr>
@@ -12609,8 +12609,8 @@
         </p:blipFill>
         <p:spPr bwMode="auto">
           <a:xfrm>
-            <a:off x="5940152" y="2320884"/>
-            <a:ext cx="2324100" cy="1466850"/>
+            <a:off x="5940152" y="412990"/>
+            <a:ext cx="2362200" cy="1485900"/>
           </a:xfrm>
           <a:prstGeom prst="rect">
             <a:avLst/>
@@ -12642,7 +12642,7 @@
       </p:pic>
       <p:pic>
         <p:nvPicPr>
-          <p:cNvPr id="3" name="Picture 4"/>
+          <p:cNvPr id="1027" name="Picture 3"/>
           <p:cNvPicPr>
             <a:picLocks noChangeAspect="1" noChangeArrowheads="1"/>
           </p:cNvPicPr>
@@ -12663,8 +12663,8 @@
         </p:blipFill>
         <p:spPr bwMode="auto">
           <a:xfrm>
-            <a:off x="3214665" y="2311359"/>
-            <a:ext cx="2362200" cy="1476375"/>
+            <a:off x="3214665" y="412886"/>
+            <a:ext cx="2381250" cy="1504950"/>
           </a:xfrm>
           <a:prstGeom prst="rect">
             <a:avLst/>
@@ -12696,7 +12696,7 @@
       </p:pic>
       <p:pic>
         <p:nvPicPr>
-          <p:cNvPr id="1026" name="Picture 2"/>
+          <p:cNvPr id="2" name="Picture 2"/>
           <p:cNvPicPr>
             <a:picLocks noChangeAspect="1" noChangeArrowheads="1"/>
           </p:cNvPicPr>
@@ -12717,8 +12717,8 @@
         </p:blipFill>
         <p:spPr bwMode="auto">
           <a:xfrm>
-            <a:off x="395536" y="404664"/>
-            <a:ext cx="2376264" cy="1479308"/>
+            <a:off x="417570" y="412990"/>
+            <a:ext cx="2390775" cy="1504950"/>
           </a:xfrm>
           <a:prstGeom prst="rect">
             <a:avLst/>
@@ -12750,7 +12750,7 @@
       </p:pic>
       <p:pic>
         <p:nvPicPr>
-          <p:cNvPr id="1028" name="Picture 4"/>
+          <p:cNvPr id="1029" name="Picture 5"/>
           <p:cNvPicPr>
             <a:picLocks noChangeAspect="1" noChangeArrowheads="1"/>
           </p:cNvPicPr>
@@ -12771,8 +12771,8 @@
         </p:blipFill>
         <p:spPr bwMode="auto">
           <a:xfrm>
-            <a:off x="3203848" y="404664"/>
-            <a:ext cx="2358147" cy="1490402"/>
+            <a:off x="5940152" y="2320884"/>
+            <a:ext cx="2324100" cy="1466850"/>
           </a:xfrm>
           <a:prstGeom prst="rect">
             <a:avLst/>
@@ -12804,7 +12804,7 @@
       </p:pic>
       <p:pic>
         <p:nvPicPr>
-          <p:cNvPr id="1030" name="Picture 6"/>
+          <p:cNvPr id="3" name="Picture 4"/>
           <p:cNvPicPr>
             <a:picLocks noChangeAspect="1" noChangeArrowheads="1"/>
           </p:cNvPicPr>
@@ -12825,8 +12825,8 @@
         </p:blipFill>
         <p:spPr bwMode="auto">
           <a:xfrm>
-            <a:off x="5940152" y="412990"/>
-            <a:ext cx="2358147" cy="1482076"/>
+            <a:off x="3214665" y="2311359"/>
+            <a:ext cx="2362200" cy="1476375"/>
           </a:xfrm>
           <a:prstGeom prst="rect">
             <a:avLst/>

</xml_diff>